<commit_message>
added "Highlights the active filter" test
implemented it

added colors.pptx
</commit_message>
<xml_diff>
--- a/Colors.pptx
+++ b/Colors.pptx
@@ -3113,6 +3113,10 @@
           <a:lstStyle/>
           <a:p>
             <a:pPr algn="ctr"/>
+            <a:r>
+              <a:rPr lang="en-US"/>
+              <a:t>\</a:t>
+            </a:r>
             <a:endParaRPr lang="en-US"/>
           </a:p>
         </p:txBody>

</xml_diff>